<commit_message>
Updated random logo stuff
</commit_message>
<xml_diff>
--- a/SJ Workspace.pptx
+++ b/SJ Workspace.pptx
@@ -6,6 +6,7 @@
   </p:sldMasterIdLst>
   <p:sldIdLst>
     <p:sldId id="256" r:id="rId2"/>
+    <p:sldId id="257" r:id="rId3"/>
   </p:sldIdLst>
   <p:sldSz cx="12192000" cy="6858000"/>
   <p:notesSz cx="6858000" cy="9144000"/>
@@ -104,6 +105,11 @@
       </a:defRPr>
     </a:lvl9pPr>
   </p:defaultTextStyle>
+  <p:extLst>
+    <p:ext uri="{EFAFB233-063F-42B5-8137-9DF3F51BA10A}">
+      <p15:sldGuideLst xmlns:p15="http://schemas.microsoft.com/office/powerpoint/2012/main"/>
+    </p:ext>
+  </p:extLst>
 </p:presentation>
 </file>
 
@@ -238,7 +244,7 @@
           <a:p>
             <a:fld id="{EE21F6F3-212A-40CC-B96B-ACFC0AE1D02B}" type="datetimeFigureOut">
               <a:rPr lang="en-US" smtClean="0"/>
-              <a:t>2/6/2014</a:t>
+              <a:t>2/15/2014</a:t>
             </a:fld>
             <a:endParaRPr lang="en-US"/>
           </a:p>
@@ -408,7 +414,7 @@
           <a:p>
             <a:fld id="{EE21F6F3-212A-40CC-B96B-ACFC0AE1D02B}" type="datetimeFigureOut">
               <a:rPr lang="en-US" smtClean="0"/>
-              <a:t>2/6/2014</a:t>
+              <a:t>2/15/2014</a:t>
             </a:fld>
             <a:endParaRPr lang="en-US"/>
           </a:p>
@@ -588,7 +594,7 @@
           <a:p>
             <a:fld id="{EE21F6F3-212A-40CC-B96B-ACFC0AE1D02B}" type="datetimeFigureOut">
               <a:rPr lang="en-US" smtClean="0"/>
-              <a:t>2/6/2014</a:t>
+              <a:t>2/15/2014</a:t>
             </a:fld>
             <a:endParaRPr lang="en-US"/>
           </a:p>
@@ -758,7 +764,7 @@
           <a:p>
             <a:fld id="{EE21F6F3-212A-40CC-B96B-ACFC0AE1D02B}" type="datetimeFigureOut">
               <a:rPr lang="en-US" smtClean="0"/>
-              <a:t>2/6/2014</a:t>
+              <a:t>2/15/2014</a:t>
             </a:fld>
             <a:endParaRPr lang="en-US"/>
           </a:p>
@@ -1004,7 +1010,7 @@
           <a:p>
             <a:fld id="{EE21F6F3-212A-40CC-B96B-ACFC0AE1D02B}" type="datetimeFigureOut">
               <a:rPr lang="en-US" smtClean="0"/>
-              <a:t>2/6/2014</a:t>
+              <a:t>2/15/2014</a:t>
             </a:fld>
             <a:endParaRPr lang="en-US"/>
           </a:p>
@@ -1236,7 +1242,7 @@
           <a:p>
             <a:fld id="{EE21F6F3-212A-40CC-B96B-ACFC0AE1D02B}" type="datetimeFigureOut">
               <a:rPr lang="en-US" smtClean="0"/>
-              <a:t>2/6/2014</a:t>
+              <a:t>2/15/2014</a:t>
             </a:fld>
             <a:endParaRPr lang="en-US"/>
           </a:p>
@@ -1603,7 +1609,7 @@
           <a:p>
             <a:fld id="{EE21F6F3-212A-40CC-B96B-ACFC0AE1D02B}" type="datetimeFigureOut">
               <a:rPr lang="en-US" smtClean="0"/>
-              <a:t>2/6/2014</a:t>
+              <a:t>2/15/2014</a:t>
             </a:fld>
             <a:endParaRPr lang="en-US"/>
           </a:p>
@@ -1721,7 +1727,7 @@
           <a:p>
             <a:fld id="{EE21F6F3-212A-40CC-B96B-ACFC0AE1D02B}" type="datetimeFigureOut">
               <a:rPr lang="en-US" smtClean="0"/>
-              <a:t>2/6/2014</a:t>
+              <a:t>2/15/2014</a:t>
             </a:fld>
             <a:endParaRPr lang="en-US"/>
           </a:p>
@@ -1816,7 +1822,7 @@
           <a:p>
             <a:fld id="{EE21F6F3-212A-40CC-B96B-ACFC0AE1D02B}" type="datetimeFigureOut">
               <a:rPr lang="en-US" smtClean="0"/>
-              <a:t>2/6/2014</a:t>
+              <a:t>2/15/2014</a:t>
             </a:fld>
             <a:endParaRPr lang="en-US"/>
           </a:p>
@@ -2093,7 +2099,7 @@
           <a:p>
             <a:fld id="{EE21F6F3-212A-40CC-B96B-ACFC0AE1D02B}" type="datetimeFigureOut">
               <a:rPr lang="en-US" smtClean="0"/>
-              <a:t>2/6/2014</a:t>
+              <a:t>2/15/2014</a:t>
             </a:fld>
             <a:endParaRPr lang="en-US"/>
           </a:p>
@@ -2346,7 +2352,7 @@
           <a:p>
             <a:fld id="{EE21F6F3-212A-40CC-B96B-ACFC0AE1D02B}" type="datetimeFigureOut">
               <a:rPr lang="en-US" smtClean="0"/>
-              <a:t>2/6/2014</a:t>
+              <a:t>2/15/2014</a:t>
             </a:fld>
             <a:endParaRPr lang="en-US"/>
           </a:p>
@@ -2559,7 +2565,7 @@
           <a:p>
             <a:fld id="{EE21F6F3-212A-40CC-B96B-ACFC0AE1D02B}" type="datetimeFigureOut">
               <a:rPr lang="en-US" smtClean="0"/>
-              <a:t>2/6/2014</a:t>
+              <a:t>2/15/2014</a:t>
             </a:fld>
             <a:endParaRPr lang="en-US"/>
           </a:p>
@@ -2972,61 +2978,151 @@
           <a:chExt cx="0" cy="0"/>
         </a:xfrm>
       </p:grpSpPr>
-      <p:sp>
-        <p:nvSpPr>
-          <p:cNvPr id="4" name="Isosceles Triangle 3"/>
+      <p:grpSp>
+        <p:nvGrpSpPr>
+          <p:cNvPr id="3" name="Group 2"/>
+          <p:cNvGrpSpPr/>
+          <p:nvPr/>
+        </p:nvGrpSpPr>
+        <p:grpSpPr>
+          <a:xfrm>
+            <a:off x="2238515" y="-247216"/>
+            <a:ext cx="6790278" cy="6321444"/>
+            <a:chOff x="206515" y="899413"/>
+            <a:chExt cx="6790278" cy="6321444"/>
+          </a:xfrm>
+        </p:grpSpPr>
+        <p:sp>
+          <p:nvSpPr>
+            <p:cNvPr id="4" name="Isosceles Triangle 3"/>
+            <p:cNvSpPr/>
+            <p:nvPr/>
+          </p:nvSpPr>
+          <p:spPr>
+            <a:xfrm rot="18116268">
+              <a:off x="3417695" y="1527536"/>
+              <a:ext cx="1615032" cy="4704243"/>
+            </a:xfrm>
+            <a:prstGeom prst="triangle">
+              <a:avLst/>
+            </a:prstGeom>
+            <a:noFill/>
+            <a:ln w="127000">
+              <a:solidFill>
+                <a:schemeClr val="bg1"/>
+              </a:solidFill>
+            </a:ln>
+          </p:spPr>
+          <p:style>
+            <a:lnRef idx="2">
+              <a:schemeClr val="accent1">
+                <a:shade val="50000"/>
+              </a:schemeClr>
+            </a:lnRef>
+            <a:fillRef idx="1">
+              <a:schemeClr val="accent1"/>
+            </a:fillRef>
+            <a:effectRef idx="0">
+              <a:schemeClr val="accent1"/>
+            </a:effectRef>
+            <a:fontRef idx="minor">
+              <a:schemeClr val="lt1"/>
+            </a:fontRef>
+          </p:style>
+          <p:txBody>
+            <a:bodyPr rtlCol="0" anchor="ctr"/>
+            <a:lstStyle/>
+            <a:p>
+              <a:pPr algn="ctr"/>
+              <a:endParaRPr lang="en-US"/>
+            </a:p>
+          </p:txBody>
+        </p:sp>
+        <p:pic>
+          <p:nvPicPr>
+            <p:cNvPr id="2" name="Picture 1"/>
+            <p:cNvPicPr>
+              <a:picLocks noChangeAspect="1"/>
+            </p:cNvPicPr>
+            <p:nvPr/>
+          </p:nvPicPr>
+          <p:blipFill>
+            <a:blip r:embed="rId2">
+              <a:extLst>
+                <a:ext uri="{28A0092B-C50C-407E-A947-70E740481C1C}">
+                  <a14:useLocalDpi xmlns:a14="http://schemas.microsoft.com/office/drawing/2010/main" val="0"/>
+                </a:ext>
+              </a:extLst>
+            </a:blip>
+            <a:stretch>
+              <a:fillRect/>
+            </a:stretch>
+          </p:blipFill>
+          <p:spPr>
+            <a:xfrm>
+              <a:off x="206515" y="899413"/>
+              <a:ext cx="6790278" cy="6321444"/>
+            </a:xfrm>
+            <a:prstGeom prst="rect">
+              <a:avLst/>
+            </a:prstGeom>
+          </p:spPr>
+        </p:pic>
+      </p:grpSp>
+    </p:spTree>
+    <p:extLst>
+      <p:ext uri="{BB962C8B-B14F-4D97-AF65-F5344CB8AC3E}">
+        <p14:creationId xmlns:p14="http://schemas.microsoft.com/office/powerpoint/2010/main" val="3552353059"/>
+      </p:ext>
+    </p:extLst>
+  </p:cSld>
+  <p:clrMapOvr>
+    <a:masterClrMapping/>
+  </p:clrMapOvr>
+  <p:timing>
+    <p:tnLst>
+      <p:par>
+        <p:cTn id="1" dur="indefinite" restart="never" nodeType="tmRoot"/>
+      </p:par>
+    </p:tnLst>
+  </p:timing>
+</p:sld>
+</file>
+
+<file path=ppt/slides/slide2.xml><?xml version="1.0" encoding="utf-8"?>
+<p:sld xmlns:a="http://schemas.openxmlformats.org/drawingml/2006/main" xmlns:r="http://schemas.openxmlformats.org/officeDocument/2006/relationships" xmlns:p="http://schemas.openxmlformats.org/presentationml/2006/main">
+  <p:cSld>
+    <p:bg>
+      <p:bgPr>
+        <a:solidFill>
+          <a:schemeClr val="tx1"/>
+        </a:solidFill>
+        <a:effectLst/>
+      </p:bgPr>
+    </p:bg>
+    <p:spTree>
+      <p:nvGrpSpPr>
+        <p:cNvPr id="1" name=""/>
+        <p:cNvGrpSpPr/>
+        <p:nvPr/>
+      </p:nvGrpSpPr>
+      <p:grpSpPr>
+        <a:xfrm>
+          <a:off x="0" y="0"/>
+          <a:ext cx="0" cy="0"/>
+          <a:chOff x="0" y="0"/>
+          <a:chExt cx="0" cy="0"/>
+        </a:xfrm>
+      </p:grpSpPr>
+      <p:sp>
+        <p:nvSpPr>
+          <p:cNvPr id="2" name="U-Turn Arrow 1"/>
           <p:cNvSpPr/>
           <p:nvPr/>
         </p:nvSpPr>
         <p:spPr>
-          <a:xfrm rot="18116268">
-            <a:off x="3417695" y="1527536"/>
-            <a:ext cx="1615032" cy="4704243"/>
-          </a:xfrm>
-          <a:prstGeom prst="triangle">
-            <a:avLst/>
-          </a:prstGeom>
-          <a:noFill/>
-          <a:ln w="127000">
-            <a:solidFill>
-              <a:schemeClr val="bg1"/>
-            </a:solidFill>
-          </a:ln>
-        </p:spPr>
-        <p:style>
-          <a:lnRef idx="2">
-            <a:schemeClr val="accent1">
-              <a:shade val="50000"/>
-            </a:schemeClr>
-          </a:lnRef>
-          <a:fillRef idx="1">
-            <a:schemeClr val="accent1"/>
-          </a:fillRef>
-          <a:effectRef idx="0">
-            <a:schemeClr val="accent1"/>
-          </a:effectRef>
-          <a:fontRef idx="minor">
-            <a:schemeClr val="lt1"/>
-          </a:fontRef>
-        </p:style>
-        <p:txBody>
-          <a:bodyPr rtlCol="0" anchor="ctr"/>
-          <a:lstStyle/>
-          <a:p>
-            <a:pPr algn="ctr"/>
-            <a:endParaRPr lang="en-US"/>
-          </a:p>
-        </p:txBody>
-      </p:sp>
-      <p:sp>
-        <p:nvSpPr>
-          <p:cNvPr id="6" name="U-Turn Arrow 5"/>
-          <p:cNvSpPr/>
-          <p:nvPr/>
-        </p:nvSpPr>
-        <p:spPr>
           <a:xfrm rot="9853417">
-            <a:off x="381895" y="-502703"/>
+            <a:off x="1169294" y="1081621"/>
             <a:ext cx="5140960" cy="7193280"/>
           </a:xfrm>
           <a:prstGeom prst="uturnArrow">
@@ -3073,7 +3169,7 @@
     </p:spTree>
     <p:extLst>
       <p:ext uri="{BB962C8B-B14F-4D97-AF65-F5344CB8AC3E}">
-        <p14:creationId xmlns:p14="http://schemas.microsoft.com/office/powerpoint/2010/main" val="3552353059"/>
+        <p14:creationId xmlns:p14="http://schemas.microsoft.com/office/powerpoint/2010/main" val="616551273"/>
       </p:ext>
     </p:extLst>
   </p:cSld>

</xml_diff>